<commit_message>
Made review changes to guide.
</commit_message>
<xml_diff>
--- a/src/images-source/images.pptx
+++ b/src/images-source/images.pptx
@@ -105,6 +105,11 @@
       </a:defRPr>
     </a:lvl9pPr>
   </p:defaultTextStyle>
+  <p:extLst>
+    <p:ext uri="{EFAFB233-063F-42B5-8137-9DF3F51BA10A}">
+      <p15:sldGuideLst xmlns:p15="http://schemas.microsoft.com/office/powerpoint/2012/main"/>
+    </p:ext>
+  </p:extLst>
 </p:presentation>
 </file>
 
@@ -257,7 +262,7 @@
           <a:p>
             <a:fld id="{D99BD0AA-209B-4ED4-BF67-F64A7F4C20D8}" type="datetimeFigureOut">
               <a:rPr lang="en-CA" smtClean="0"/>
-              <a:t>2019-07-21</a:t>
+              <a:t>2019-08-02</a:t>
             </a:fld>
             <a:endParaRPr lang="en-CA"/>
           </a:p>
@@ -457,7 +462,7 @@
           <a:p>
             <a:fld id="{D99BD0AA-209B-4ED4-BF67-F64A7F4C20D8}" type="datetimeFigureOut">
               <a:rPr lang="en-CA" smtClean="0"/>
-              <a:t>2019-07-21</a:t>
+              <a:t>2019-08-02</a:t>
             </a:fld>
             <a:endParaRPr lang="en-CA"/>
           </a:p>
@@ -667,7 +672,7 @@
           <a:p>
             <a:fld id="{D99BD0AA-209B-4ED4-BF67-F64A7F4C20D8}" type="datetimeFigureOut">
               <a:rPr lang="en-CA" smtClean="0"/>
-              <a:t>2019-07-21</a:t>
+              <a:t>2019-08-02</a:t>
             </a:fld>
             <a:endParaRPr lang="en-CA"/>
           </a:p>
@@ -867,7 +872,7 @@
           <a:p>
             <a:fld id="{D99BD0AA-209B-4ED4-BF67-F64A7F4C20D8}" type="datetimeFigureOut">
               <a:rPr lang="en-CA" smtClean="0"/>
-              <a:t>2019-07-21</a:t>
+              <a:t>2019-08-02</a:t>
             </a:fld>
             <a:endParaRPr lang="en-CA"/>
           </a:p>
@@ -1143,7 +1148,7 @@
           <a:p>
             <a:fld id="{D99BD0AA-209B-4ED4-BF67-F64A7F4C20D8}" type="datetimeFigureOut">
               <a:rPr lang="en-CA" smtClean="0"/>
-              <a:t>2019-07-21</a:t>
+              <a:t>2019-08-02</a:t>
             </a:fld>
             <a:endParaRPr lang="en-CA"/>
           </a:p>
@@ -1411,7 +1416,7 @@
           <a:p>
             <a:fld id="{D99BD0AA-209B-4ED4-BF67-F64A7F4C20D8}" type="datetimeFigureOut">
               <a:rPr lang="en-CA" smtClean="0"/>
-              <a:t>2019-07-21</a:t>
+              <a:t>2019-08-02</a:t>
             </a:fld>
             <a:endParaRPr lang="en-CA"/>
           </a:p>
@@ -1826,7 +1831,7 @@
           <a:p>
             <a:fld id="{D99BD0AA-209B-4ED4-BF67-F64A7F4C20D8}" type="datetimeFigureOut">
               <a:rPr lang="en-CA" smtClean="0"/>
-              <a:t>2019-07-21</a:t>
+              <a:t>2019-08-02</a:t>
             </a:fld>
             <a:endParaRPr lang="en-CA"/>
           </a:p>
@@ -1968,7 +1973,7 @@
           <a:p>
             <a:fld id="{D99BD0AA-209B-4ED4-BF67-F64A7F4C20D8}" type="datetimeFigureOut">
               <a:rPr lang="en-CA" smtClean="0"/>
-              <a:t>2019-07-21</a:t>
+              <a:t>2019-08-02</a:t>
             </a:fld>
             <a:endParaRPr lang="en-CA"/>
           </a:p>
@@ -2081,7 +2086,7 @@
           <a:p>
             <a:fld id="{D99BD0AA-209B-4ED4-BF67-F64A7F4C20D8}" type="datetimeFigureOut">
               <a:rPr lang="en-CA" smtClean="0"/>
-              <a:t>2019-07-21</a:t>
+              <a:t>2019-08-02</a:t>
             </a:fld>
             <a:endParaRPr lang="en-CA"/>
           </a:p>
@@ -2394,7 +2399,7 @@
           <a:p>
             <a:fld id="{D99BD0AA-209B-4ED4-BF67-F64A7F4C20D8}" type="datetimeFigureOut">
               <a:rPr lang="en-CA" smtClean="0"/>
-              <a:t>2019-07-21</a:t>
+              <a:t>2019-08-02</a:t>
             </a:fld>
             <a:endParaRPr lang="en-CA"/>
           </a:p>
@@ -2683,7 +2688,7 @@
           <a:p>
             <a:fld id="{D99BD0AA-209B-4ED4-BF67-F64A7F4C20D8}" type="datetimeFigureOut">
               <a:rPr lang="en-CA" smtClean="0"/>
-              <a:t>2019-07-21</a:t>
+              <a:t>2019-08-02</a:t>
             </a:fld>
             <a:endParaRPr lang="en-CA"/>
           </a:p>
@@ -2926,7 +2931,7 @@
           <a:p>
             <a:fld id="{D99BD0AA-209B-4ED4-BF67-F64A7F4C20D8}" type="datetimeFigureOut">
               <a:rPr lang="en-CA" smtClean="0"/>
-              <a:t>2019-07-21</a:t>
+              <a:t>2019-08-02</a:t>
             </a:fld>
             <a:endParaRPr lang="en-CA"/>
           </a:p>
@@ -3357,8 +3362,8 @@
         </p:nvGrpSpPr>
         <p:grpSpPr>
           <a:xfrm>
-            <a:off x="812051" y="283028"/>
-            <a:ext cx="3345169" cy="3318011"/>
+            <a:off x="831929" y="292967"/>
+            <a:ext cx="3345169" cy="3801955"/>
             <a:chOff x="812051" y="283028"/>
             <a:chExt cx="3345169" cy="3318011"/>
           </a:xfrm>
@@ -3508,7 +3513,7 @@
               <a:pPr algn="ctr"/>
               <a:r>
                 <a:rPr lang="en-CA" dirty="0"/>
-                <a:t>Other Info  (0..*)</a:t>
+                <a:t>Other Documentation  (0..*)</a:t>
               </a:r>
             </a:p>
           </p:txBody>

</xml_diff>